<commit_message>
update code stm 2
</commit_message>
<xml_diff>
--- a/ppt_doc/pin_diagram.pptx
+++ b/ppt_doc/pin_diagram.pptx
@@ -262,7 +262,7 @@
           <a:p>
             <a:fld id="{AB35F315-D6CE-4C8D-9232-B2305DBC9767}" type="datetimeFigureOut">
               <a:rPr lang="en-US" smtClean="0"/>
-              <a:t>7/20/2025</a:t>
+              <a:t>7/26/2025</a:t>
             </a:fld>
             <a:endParaRPr lang="en-US"/>
           </a:p>
@@ -460,7 +460,7 @@
           <a:p>
             <a:fld id="{AB35F315-D6CE-4C8D-9232-B2305DBC9767}" type="datetimeFigureOut">
               <a:rPr lang="en-US" smtClean="0"/>
-              <a:t>7/20/2025</a:t>
+              <a:t>7/26/2025</a:t>
             </a:fld>
             <a:endParaRPr lang="en-US"/>
           </a:p>
@@ -668,7 +668,7 @@
           <a:p>
             <a:fld id="{AB35F315-D6CE-4C8D-9232-B2305DBC9767}" type="datetimeFigureOut">
               <a:rPr lang="en-US" smtClean="0"/>
-              <a:t>7/20/2025</a:t>
+              <a:t>7/26/2025</a:t>
             </a:fld>
             <a:endParaRPr lang="en-US"/>
           </a:p>
@@ -866,7 +866,7 @@
           <a:p>
             <a:fld id="{AB35F315-D6CE-4C8D-9232-B2305DBC9767}" type="datetimeFigureOut">
               <a:rPr lang="en-US" smtClean="0"/>
-              <a:t>7/20/2025</a:t>
+              <a:t>7/26/2025</a:t>
             </a:fld>
             <a:endParaRPr lang="en-US"/>
           </a:p>
@@ -1141,7 +1141,7 @@
           <a:p>
             <a:fld id="{AB35F315-D6CE-4C8D-9232-B2305DBC9767}" type="datetimeFigureOut">
               <a:rPr lang="en-US" smtClean="0"/>
-              <a:t>7/20/2025</a:t>
+              <a:t>7/26/2025</a:t>
             </a:fld>
             <a:endParaRPr lang="en-US"/>
           </a:p>
@@ -1406,7 +1406,7 @@
           <a:p>
             <a:fld id="{AB35F315-D6CE-4C8D-9232-B2305DBC9767}" type="datetimeFigureOut">
               <a:rPr lang="en-US" smtClean="0"/>
-              <a:t>7/20/2025</a:t>
+              <a:t>7/26/2025</a:t>
             </a:fld>
             <a:endParaRPr lang="en-US"/>
           </a:p>
@@ -1818,7 +1818,7 @@
           <a:p>
             <a:fld id="{AB35F315-D6CE-4C8D-9232-B2305DBC9767}" type="datetimeFigureOut">
               <a:rPr lang="en-US" smtClean="0"/>
-              <a:t>7/20/2025</a:t>
+              <a:t>7/26/2025</a:t>
             </a:fld>
             <a:endParaRPr lang="en-US"/>
           </a:p>
@@ -1959,7 +1959,7 @@
           <a:p>
             <a:fld id="{AB35F315-D6CE-4C8D-9232-B2305DBC9767}" type="datetimeFigureOut">
               <a:rPr lang="en-US" smtClean="0"/>
-              <a:t>7/20/2025</a:t>
+              <a:t>7/26/2025</a:t>
             </a:fld>
             <a:endParaRPr lang="en-US"/>
           </a:p>
@@ -2072,7 +2072,7 @@
           <a:p>
             <a:fld id="{AB35F315-D6CE-4C8D-9232-B2305DBC9767}" type="datetimeFigureOut">
               <a:rPr lang="en-US" smtClean="0"/>
-              <a:t>7/20/2025</a:t>
+              <a:t>7/26/2025</a:t>
             </a:fld>
             <a:endParaRPr lang="en-US"/>
           </a:p>
@@ -2383,7 +2383,7 @@
           <a:p>
             <a:fld id="{AB35F315-D6CE-4C8D-9232-B2305DBC9767}" type="datetimeFigureOut">
               <a:rPr lang="en-US" smtClean="0"/>
-              <a:t>7/20/2025</a:t>
+              <a:t>7/26/2025</a:t>
             </a:fld>
             <a:endParaRPr lang="en-US"/>
           </a:p>
@@ -2671,7 +2671,7 @@
           <a:p>
             <a:fld id="{AB35F315-D6CE-4C8D-9232-B2305DBC9767}" type="datetimeFigureOut">
               <a:rPr lang="en-US" smtClean="0"/>
-              <a:t>7/20/2025</a:t>
+              <a:t>7/26/2025</a:t>
             </a:fld>
             <a:endParaRPr lang="en-US"/>
           </a:p>
@@ -2912,7 +2912,7 @@
           <a:p>
             <a:fld id="{AB35F315-D6CE-4C8D-9232-B2305DBC9767}" type="datetimeFigureOut">
               <a:rPr lang="en-US" smtClean="0"/>
-              <a:t>7/20/2025</a:t>
+              <a:t>7/26/2025</a:t>
             </a:fld>
             <a:endParaRPr lang="en-US"/>
           </a:p>

</xml_diff>